<commit_message>
add fig1c: stats for R-square values
</commit_message>
<xml_diff>
--- a/analysis/plots/fig5.pptx
+++ b/analysis/plots/fig5.pptx
@@ -243,7 +243,7 @@
           <a:p>
             <a:fld id="{BC6E9828-D5E3-F94A-8FD0-502DCA9B4680}" type="datetimeFigureOut">
               <a:rPr lang="en-US" smtClean="0"/>
-              <a:t>7/30/21</a:t>
+              <a:t>8/13/21</a:t>
             </a:fld>
             <a:endParaRPr lang="en-US"/>
           </a:p>
@@ -413,7 +413,7 @@
           <a:p>
             <a:fld id="{BC6E9828-D5E3-F94A-8FD0-502DCA9B4680}" type="datetimeFigureOut">
               <a:rPr lang="en-US" smtClean="0"/>
-              <a:t>7/30/21</a:t>
+              <a:t>8/13/21</a:t>
             </a:fld>
             <a:endParaRPr lang="en-US"/>
           </a:p>
@@ -593,7 +593,7 @@
           <a:p>
             <a:fld id="{BC6E9828-D5E3-F94A-8FD0-502DCA9B4680}" type="datetimeFigureOut">
               <a:rPr lang="en-US" smtClean="0"/>
-              <a:t>7/30/21</a:t>
+              <a:t>8/13/21</a:t>
             </a:fld>
             <a:endParaRPr lang="en-US"/>
           </a:p>
@@ -763,7 +763,7 @@
           <a:p>
             <a:fld id="{BC6E9828-D5E3-F94A-8FD0-502DCA9B4680}" type="datetimeFigureOut">
               <a:rPr lang="en-US" smtClean="0"/>
-              <a:t>7/30/21</a:t>
+              <a:t>8/13/21</a:t>
             </a:fld>
             <a:endParaRPr lang="en-US"/>
           </a:p>
@@ -1009,7 +1009,7 @@
           <a:p>
             <a:fld id="{BC6E9828-D5E3-F94A-8FD0-502DCA9B4680}" type="datetimeFigureOut">
               <a:rPr lang="en-US" smtClean="0"/>
-              <a:t>7/30/21</a:t>
+              <a:t>8/13/21</a:t>
             </a:fld>
             <a:endParaRPr lang="en-US"/>
           </a:p>
@@ -1241,7 +1241,7 @@
           <a:p>
             <a:fld id="{BC6E9828-D5E3-F94A-8FD0-502DCA9B4680}" type="datetimeFigureOut">
               <a:rPr lang="en-US" smtClean="0"/>
-              <a:t>7/30/21</a:t>
+              <a:t>8/13/21</a:t>
             </a:fld>
             <a:endParaRPr lang="en-US"/>
           </a:p>
@@ -1608,7 +1608,7 @@
           <a:p>
             <a:fld id="{BC6E9828-D5E3-F94A-8FD0-502DCA9B4680}" type="datetimeFigureOut">
               <a:rPr lang="en-US" smtClean="0"/>
-              <a:t>7/30/21</a:t>
+              <a:t>8/13/21</a:t>
             </a:fld>
             <a:endParaRPr lang="en-US"/>
           </a:p>
@@ -1726,7 +1726,7 @@
           <a:p>
             <a:fld id="{BC6E9828-D5E3-F94A-8FD0-502DCA9B4680}" type="datetimeFigureOut">
               <a:rPr lang="en-US" smtClean="0"/>
-              <a:t>7/30/21</a:t>
+              <a:t>8/13/21</a:t>
             </a:fld>
             <a:endParaRPr lang="en-US"/>
           </a:p>
@@ -1821,7 +1821,7 @@
           <a:p>
             <a:fld id="{BC6E9828-D5E3-F94A-8FD0-502DCA9B4680}" type="datetimeFigureOut">
               <a:rPr lang="en-US" smtClean="0"/>
-              <a:t>7/30/21</a:t>
+              <a:t>8/13/21</a:t>
             </a:fld>
             <a:endParaRPr lang="en-US"/>
           </a:p>
@@ -2098,7 +2098,7 @@
           <a:p>
             <a:fld id="{BC6E9828-D5E3-F94A-8FD0-502DCA9B4680}" type="datetimeFigureOut">
               <a:rPr lang="en-US" smtClean="0"/>
-              <a:t>7/30/21</a:t>
+              <a:t>8/13/21</a:t>
             </a:fld>
             <a:endParaRPr lang="en-US"/>
           </a:p>
@@ -2355,7 +2355,7 @@
           <a:p>
             <a:fld id="{BC6E9828-D5E3-F94A-8FD0-502DCA9B4680}" type="datetimeFigureOut">
               <a:rPr lang="en-US" smtClean="0"/>
-              <a:t>7/30/21</a:t>
+              <a:t>8/13/21</a:t>
             </a:fld>
             <a:endParaRPr lang="en-US"/>
           </a:p>
@@ -2568,7 +2568,7 @@
           <a:p>
             <a:fld id="{BC6E9828-D5E3-F94A-8FD0-502DCA9B4680}" type="datetimeFigureOut">
               <a:rPr lang="en-US" smtClean="0"/>
-              <a:t>7/30/21</a:t>
+              <a:t>8/13/21</a:t>
             </a:fld>
             <a:endParaRPr lang="en-US"/>
           </a:p>
@@ -2995,7 +2995,7 @@
         </p:blipFill>
         <p:spPr>
           <a:xfrm>
-            <a:off x="0" y="0"/>
+            <a:off x="5080000" y="0"/>
             <a:ext cx="6350000" cy="6858000"/>
           </a:xfrm>
           <a:prstGeom prst="rect">
@@ -3025,8 +3025,118 @@
         </p:blipFill>
         <p:spPr>
           <a:xfrm>
-            <a:off x="6172200" y="0"/>
+            <a:off x="0" y="0"/>
             <a:ext cx="5257800" cy="6502400"/>
+          </a:xfrm>
+          <a:prstGeom prst="rect">
+            <a:avLst/>
+          </a:prstGeom>
+        </p:spPr>
+      </p:pic>
+      <p:pic>
+        <p:nvPicPr>
+          <p:cNvPr id="4" name="Picture 3">
+            <a:extLst>
+              <a:ext uri="{FF2B5EF4-FFF2-40B4-BE49-F238E27FC236}">
+                <a16:creationId xmlns:a16="http://schemas.microsoft.com/office/drawing/2014/main" id="{6011E211-796E-0041-9DFB-FF94C315E89C}"/>
+              </a:ext>
+            </a:extLst>
+          </p:cNvPr>
+          <p:cNvPicPr>
+            <a:picLocks noChangeAspect="1"/>
+          </p:cNvPicPr>
+          <p:nvPr/>
+        </p:nvPicPr>
+        <p:blipFill rotWithShape="1">
+          <a:blip r:embed="rId2"/>
+          <a:srcRect l="4200" r="88800" b="93519"/>
+          <a:stretch/>
+        </p:blipFill>
+        <p:spPr>
+          <a:xfrm>
+            <a:off x="0" y="0"/>
+            <a:ext cx="444500" cy="444500"/>
+          </a:xfrm>
+          <a:prstGeom prst="rect">
+            <a:avLst/>
+          </a:prstGeom>
+        </p:spPr>
+      </p:pic>
+      <p:sp>
+        <p:nvSpPr>
+          <p:cNvPr id="2" name="Rectangle 1">
+            <a:extLst>
+              <a:ext uri="{FF2B5EF4-FFF2-40B4-BE49-F238E27FC236}">
+                <a16:creationId xmlns:a16="http://schemas.microsoft.com/office/drawing/2014/main" id="{871F1444-0058-114D-8B5D-917C40A7EE93}"/>
+              </a:ext>
+            </a:extLst>
+          </p:cNvPr>
+          <p:cNvSpPr/>
+          <p:nvPr/>
+        </p:nvSpPr>
+        <p:spPr>
+          <a:xfrm>
+            <a:off x="5359400" y="0"/>
+            <a:ext cx="393700" cy="444500"/>
+          </a:xfrm>
+          <a:prstGeom prst="rect">
+            <a:avLst/>
+          </a:prstGeom>
+          <a:solidFill>
+            <a:schemeClr val="bg1"/>
+          </a:solidFill>
+          <a:ln>
+            <a:noFill/>
+          </a:ln>
+        </p:spPr>
+        <p:style>
+          <a:lnRef idx="2">
+            <a:schemeClr val="accent1">
+              <a:shade val="50000"/>
+            </a:schemeClr>
+          </a:lnRef>
+          <a:fillRef idx="1">
+            <a:schemeClr val="accent1"/>
+          </a:fillRef>
+          <a:effectRef idx="0">
+            <a:schemeClr val="accent1"/>
+          </a:effectRef>
+          <a:fontRef idx="minor">
+            <a:schemeClr val="lt1"/>
+          </a:fontRef>
+        </p:style>
+        <p:txBody>
+          <a:bodyPr rtlCol="0" anchor="ctr"/>
+          <a:lstStyle/>
+          <a:p>
+            <a:pPr algn="ctr"/>
+            <a:endParaRPr lang="en-US"/>
+          </a:p>
+        </p:txBody>
+      </p:sp>
+      <p:pic>
+        <p:nvPicPr>
+          <p:cNvPr id="5" name="Picture 4">
+            <a:extLst>
+              <a:ext uri="{FF2B5EF4-FFF2-40B4-BE49-F238E27FC236}">
+                <a16:creationId xmlns:a16="http://schemas.microsoft.com/office/drawing/2014/main" id="{970E6DB6-3D75-E641-A7F8-2C5FF125093C}"/>
+              </a:ext>
+            </a:extLst>
+          </p:cNvPr>
+          <p:cNvPicPr>
+            <a:picLocks noChangeAspect="1"/>
+          </p:cNvPicPr>
+          <p:nvPr/>
+        </p:nvPicPr>
+        <p:blipFill rotWithShape="1">
+          <a:blip r:embed="rId3"/>
+          <a:srcRect r="93236" b="93555"/>
+          <a:stretch/>
+        </p:blipFill>
+        <p:spPr>
+          <a:xfrm>
+            <a:off x="5346700" y="0"/>
+            <a:ext cx="355600" cy="419100"/>
           </a:xfrm>
           <a:prstGeom prst="rect">
             <a:avLst/>

</xml_diff>